<commit_message>
Updated Quan's time log slide - ZWT
</commit_message>
<xml_diff>
--- a/CIS 641 PRESENTATION 1.pptx
+++ b/CIS 641 PRESENTATION 1.pptx
@@ -14267,14 +14267,38 @@
             <a:pPr lvl="1"/>
             <a:r>
               <a:rPr lang="en-US" sz="2500" dirty="0" smtClean="0"/>
-              <a:t>Time Log (Starting 10/7/13)</a:t>
-            </a:r>
+              <a:t>Time Log (Starting 10/7/13</a:t>
+            </a:r>
+            <a:r>
+              <a:rPr lang="en-US" sz="2500" dirty="0" smtClean="0"/>
+              <a:t>)</a:t>
+            </a:r>
+            <a:endParaRPr lang="en-US" sz="2500" dirty="0" smtClean="0"/>
           </a:p>
           <a:p>
             <a:pPr lvl="2"/>
             <a:r>
               <a:rPr lang="en-US" sz="1700" dirty="0" smtClean="0"/>
-              <a:t>10/07/13 – </a:t>
+              <a:t>Prior – Research Sudoku fundamentals and algorithms for solving. Look into number creation.</a:t>
+            </a:r>
+          </a:p>
+          <a:p>
+            <a:pPr lvl="2"/>
+            <a:r>
+              <a:rPr lang="en-US" sz="1700" dirty="0" smtClean="0"/>
+              <a:t>Prior – Looked into GUI and MFC in C++</a:t>
+            </a:r>
+            <a:endParaRPr lang="en-US" sz="1700" dirty="0" smtClean="0"/>
+          </a:p>
+          <a:p>
+            <a:pPr lvl="2"/>
+            <a:r>
+              <a:rPr lang="en-US" sz="1700" dirty="0" smtClean="0"/>
+              <a:t>10/07/13 </a:t>
+            </a:r>
+            <a:r>
+              <a:rPr lang="en-US" sz="1700" dirty="0" smtClean="0"/>
+              <a:t>– </a:t>
             </a:r>
             <a:r>
               <a:rPr lang="en-US" sz="1700" dirty="0"/>

</xml_diff>

<commit_message>
Added time log for Tanmay - ZWT
</commit_message>
<xml_diff>
--- a/CIS 641 PRESENTATION 1.pptx
+++ b/CIS 641 PRESENTATION 1.pptx
@@ -13537,6 +13537,13 @@
   <p:clrMapOvr>
     <a:masterClrMapping/>
   </p:clrMapOvr>
+  <p:timing>
+    <p:tnLst>
+      <p:par>
+        <p:cTn id="1" dur="indefinite" restart="never" nodeType="tmRoot"/>
+      </p:par>
+    </p:tnLst>
+  </p:timing>
 </p:sld>
 </file>
 
@@ -14035,8 +14042,20 @@
             <a:pPr lvl="2"/>
             <a:r>
               <a:rPr lang="en-US" sz="1700" dirty="0" smtClean="0"/>
-              <a:t>10/08/13 – Brainstorm gameplay code mechanics</a:t>
-            </a:r>
+              <a:t>10/08/13 – Brainstorm gameplay code </a:t>
+            </a:r>
+            <a:r>
+              <a:rPr lang="en-US" sz="1700" dirty="0" smtClean="0"/>
+              <a:t>mechanics</a:t>
+            </a:r>
+          </a:p>
+          <a:p>
+            <a:pPr lvl="2"/>
+            <a:r>
+              <a:rPr lang="en-US" sz="1700" dirty="0" smtClean="0"/>
+              <a:t>10/10/13 – Research</a:t>
+            </a:r>
+            <a:endParaRPr lang="en-US" sz="1700" dirty="0" smtClean="0"/>
           </a:p>
           <a:p>
             <a:pPr lvl="2"/>
@@ -14267,13 +14286,8 @@
             <a:pPr lvl="1"/>
             <a:r>
               <a:rPr lang="en-US" sz="2500" dirty="0" smtClean="0"/>
-              <a:t>Time Log (Starting 10/7/13</a:t>
-            </a:r>
-            <a:r>
-              <a:rPr lang="en-US" sz="2500" dirty="0" smtClean="0"/>
-              <a:t>)</a:t>
-            </a:r>
-            <a:endParaRPr lang="en-US" sz="2500" dirty="0" smtClean="0"/>
+              <a:t>Time Log (Starting 10/7/13)</a:t>
+            </a:r>
           </a:p>
           <a:p>
             <a:pPr lvl="2"/>
@@ -14288,17 +14302,12 @@
               <a:rPr lang="en-US" sz="1700" dirty="0" smtClean="0"/>
               <a:t>Prior – Looked into GUI and MFC in C++</a:t>
             </a:r>
-            <a:endParaRPr lang="en-US" sz="1700" dirty="0" smtClean="0"/>
           </a:p>
           <a:p>
             <a:pPr lvl="2"/>
             <a:r>
               <a:rPr lang="en-US" sz="1700" dirty="0" smtClean="0"/>
-              <a:t>10/07/13 </a:t>
-            </a:r>
-            <a:r>
-              <a:rPr lang="en-US" sz="1700" dirty="0" smtClean="0"/>
-              <a:t>– </a:t>
+              <a:t>10/07/13 – </a:t>
             </a:r>
             <a:r>
               <a:rPr lang="en-US" sz="1700" dirty="0"/>

</xml_diff>